<commit_message>
small refactorings and bugfixes
</commit_message>
<xml_diff>
--- a/source/docs/source/_images/add_costume.pptx
+++ b/source/docs/source/_images/add_costume.pptx
@@ -6,9 +6,10 @@
   </p:sldMasterIdLst>
   <p:sldIdLst>
     <p:sldId id="256" r:id="rId3"/>
+    <p:sldId id="257" r:id="rId4"/>
   </p:sldIdLst>
   <p:sldSz cx="12192000" cy="6858000"/>
-  <p:notesSz cx="6858000" cy="12192000"/>
+  <p:notesSz cx="12192000" cy="6858000"/>
   <p:defaultTextStyle>
     <a:defPPr>
       <a:defRPr lang="de-DE"/>
@@ -3286,7 +3287,7 @@
           <p:nvPr isPhoto="0" userDrawn="0"/>
         </p:nvCxnSpPr>
         <p:spPr bwMode="auto">
-          <a:xfrm rot="10799990" flipH="0" flipV="1">
+          <a:xfrm rot="10799989" flipH="0" flipV="1">
             <a:off x="1980320" y="1385082"/>
             <a:ext cx="748659" cy="439907"/>
           </a:xfrm>
@@ -3365,6 +3366,365 @@
           </a:fontRef>
         </p:style>
       </p:sp>
+    </p:spTree>
+  </p:cSld>
+  <p:clrMapOvr>
+    <a:masterClrMapping/>
+  </p:clrMapOvr>
+  <mc:AlternateContent xmlns:mc="http://schemas.openxmlformats.org/markup-compatibility/2006">
+    <mc:Choice xmlns:p14="http://schemas.microsoft.com/office/powerpoint/2010/main" Requires="p14">
+      <p:transition p14:dur="2000" advClick="1"/>
+    </mc:Choice>
+    <mc:Fallback>
+      <p:transition advClick="1"/>
+    </mc:Fallback>
+  </mc:AlternateContent>
+</p:sld>
+</file>
+
+<file path=ppt/slides/slide2.xml><?xml version="1.0" encoding="utf-8"?>
+<p:sld xmlns:a="http://schemas.openxmlformats.org/drawingml/2006/main" xmlns:r="http://schemas.openxmlformats.org/officeDocument/2006/relationships" xmlns:p="http://schemas.openxmlformats.org/presentationml/2006/main" xmlns:m="http://schemas.openxmlformats.org/officeDocument/2006/math" xmlns:w="http://schemas.openxmlformats.org/wordprocessingml/2006/main" showMasterPhAnim="0" show="1">
+  <p:cSld name="">
+    <p:spTree>
+      <p:nvGrpSpPr>
+        <p:cNvPr id="1" name="" hidden="0"/>
+        <p:cNvGrpSpPr/>
+        <p:nvPr isPhoto="0" userDrawn="0"/>
+      </p:nvGrpSpPr>
+      <p:grpSpPr bwMode="auto">
+        <a:xfrm>
+          <a:off x="0" y="0"/>
+          <a:ext cx="0" cy="0"/>
+          <a:chOff x="0" y="0"/>
+          <a:chExt cx="0" cy="0"/>
+        </a:xfrm>
+      </p:grpSpPr>
+      <p:pic>
+        <p:nvPicPr>
+          <p:cNvPr id="336307862" name="" hidden="0"/>
+          <p:cNvPicPr>
+            <a:picLocks noChangeAspect="1"/>
+          </p:cNvPicPr>
+          <p:nvPr isPhoto="0" userDrawn="0"/>
+        </p:nvPicPr>
+        <p:blipFill>
+          <a:blip r:embed="rId2"/>
+          <a:stretch/>
+        </p:blipFill>
+        <p:spPr bwMode="auto">
+          <a:xfrm flipH="0" flipV="0">
+            <a:off x="1373037" y="1617452"/>
+            <a:ext cx="3245688" cy="3245688"/>
+          </a:xfrm>
+          <a:prstGeom prst="rect">
+            <a:avLst/>
+          </a:prstGeom>
+        </p:spPr>
+      </p:pic>
+      <p:sp>
+        <p:nvSpPr>
+          <p:cNvPr id="825501726" name="" hidden="0"/>
+          <p:cNvSpPr/>
+          <p:nvPr isPhoto="0" userDrawn="0"/>
+        </p:nvSpPr>
+        <p:spPr bwMode="auto">
+          <a:xfrm flipH="0" flipV="0">
+            <a:off x="2158443" y="1617452"/>
+            <a:ext cx="8590471" cy="1280196"/>
+          </a:xfrm>
+        </p:spPr>
+        <p:txBody>
+          <a:bodyPr rot="0" spcFirstLastPara="0" vertOverflow="overflow" horzOverflow="clip" vert="horz" wrap="square" lIns="91440" tIns="45720" rIns="91440" bIns="45720" numCol="1" spcCol="0" rtlCol="0" fromWordArt="0" anchor="t" anchorCtr="0" forceAA="0" upright="0" compatLnSpc="1">
+            <a:prstTxWarp prst="textNoShape"/>
+            <a:noAutofit/>
+          </a:bodyPr>
+          <a:p>
+            <a:pPr>
+              <a:defRPr/>
+            </a:pPr>
+            <a:r>
+              <a:rPr sz="2200" b="0" i="0" u="none">
+                <a:solidFill>
+                  <a:schemeClr val="tx1"/>
+                </a:solidFill>
+                <a:latin typeface="Droid Sans Mono"/>
+                <a:ea typeface="Droid Sans Mono"/>
+                <a:cs typeface="Droid Sans Mono"/>
+              </a:rPr>
+              <a:t>miniworldmaker.ActionTimer(24, </a:t>
+            </a:r>
+            <a:r>
+              <a:rPr sz="2200" b="0" i="0" u="none">
+                <a:solidFill>
+                  <a:schemeClr val="accent5">
+                    <a:lumMod val="75000"/>
+                  </a:schemeClr>
+                </a:solidFill>
+                <a:latin typeface="Droid Sans Mono"/>
+                <a:ea typeface="Droid Sans Mono"/>
+                <a:cs typeface="Droid Sans Mono"/>
+              </a:rPr>
+              <a:t>player.move</a:t>
+            </a:r>
+            <a:r>
+              <a:rPr sz="2200" b="0" i="0" u="none">
+                <a:solidFill>
+                  <a:schemeClr val="tx1"/>
+                </a:solidFill>
+                <a:latin typeface="Droid Sans Mono"/>
+                <a:ea typeface="Droid Sans Mono"/>
+                <a:cs typeface="Droid Sans Mono"/>
+              </a:rPr>
+              <a:t>)</a:t>
+            </a:r>
+            <a:endParaRPr sz="2200" b="0" i="0" u="none">
+              <a:solidFill>
+                <a:schemeClr val="tx1"/>
+              </a:solidFill>
+              <a:latin typeface="Droid Sans Mono"/>
+              <a:ea typeface="Droid Sans Mono"/>
+              <a:cs typeface="Droid Sans Mono"/>
+            </a:endParaRPr>
+          </a:p>
+        </p:txBody>
+      </p:sp>
+      <p:sp>
+        <p:nvSpPr>
+          <p:cNvPr id="1980100499" name="" hidden="0"/>
+          <p:cNvSpPr/>
+          <p:nvPr isPhoto="0" userDrawn="0"/>
+        </p:nvSpPr>
+        <p:spPr bwMode="auto">
+          <a:xfrm flipH="0" flipV="0">
+            <a:off x="2607735" y="4618726"/>
+            <a:ext cx="2102688" cy="862641"/>
+          </a:xfrm>
+          <a:prstGeom prst="wedgeRectCallout">
+            <a:avLst>
+              <a:gd name="adj1" fmla="val -30588"/>
+              <a:gd name="adj2" fmla="val -64423"/>
+            </a:avLst>
+          </a:prstGeom>
+          <a:solidFill>
+            <a:schemeClr val="bg1"/>
+          </a:solidFill>
+          <a:ln w="12700" cap="flat" cmpd="sng" algn="ctr">
+            <a:solidFill>
+              <a:schemeClr val="accent3">
+                <a:lumMod val="60000"/>
+                <a:lumOff val="40000"/>
+              </a:schemeClr>
+            </a:solidFill>
+            <a:prstDash val="solid"/>
+            <a:miter/>
+          </a:ln>
+        </p:spPr>
+        <p:style>
+          <a:lnRef idx="2">
+            <a:schemeClr val="accent1">
+              <a:shade val="50000"/>
+            </a:schemeClr>
+          </a:lnRef>
+          <a:fillRef idx="1">
+            <a:schemeClr val="accent1"/>
+          </a:fillRef>
+          <a:effectRef idx="0">
+            <a:schemeClr val="accent1"/>
+          </a:effectRef>
+          <a:fontRef idx="minor">
+            <a:schemeClr val="lt1"/>
+          </a:fontRef>
+        </p:style>
+        <p:txBody>
+          <a:bodyPr/>
+          <a:p>
+            <a:pPr>
+              <a:defRPr/>
+            </a:pPr>
+            <a:r>
+              <a:rPr>
+                <a:solidFill>
+                  <a:schemeClr val="tx1"/>
+                </a:solidFill>
+              </a:rPr>
+              <a:t>Erstelle zuerst den ActionTimer</a:t>
+            </a:r>
+            <a:endParaRPr>
+              <a:solidFill>
+                <a:schemeClr val="tx1"/>
+              </a:solidFill>
+            </a:endParaRPr>
+          </a:p>
+        </p:txBody>
+      </p:sp>
+      <p:cxnSp>
+        <p:nvCxnSpPr>
+          <p:cNvPr id="0" name="" hidden="0"/>
+          <p:cNvCxnSpPr>
+            <a:cxnSpLocks/>
+          </p:cNvCxnSpPr>
+          <p:nvPr isPhoto="0" userDrawn="0"/>
+        </p:nvCxnSpPr>
+        <p:spPr bwMode="auto">
+          <a:xfrm flipH="0" flipV="1">
+            <a:off x="4386933" y="3396650"/>
+            <a:ext cx="4277264" cy="0"/>
+          </a:xfrm>
+          <a:prstGeom prst="line">
+            <a:avLst/>
+          </a:prstGeom>
+          <a:ln w="76199" cap="flat" cmpd="sng" algn="ctr">
+            <a:solidFill>
+              <a:schemeClr val="tx1">
+                <a:lumMod val="65098"/>
+                <a:lumOff val="34902"/>
+              </a:schemeClr>
+            </a:solidFill>
+            <a:prstDash val="solid"/>
+            <a:miter/>
+            <a:tailEnd type="arrow" len="med"/>
+          </a:ln>
+        </p:spPr>
+        <p:style>
+          <a:lnRef idx="1">
+            <a:schemeClr val="accent1">
+              <a:shade val="50000"/>
+            </a:schemeClr>
+          </a:lnRef>
+          <a:fillRef idx="0">
+            <a:schemeClr val="accent1"/>
+          </a:fillRef>
+          <a:effectRef idx="0">
+            <a:schemeClr val="accent1"/>
+          </a:effectRef>
+          <a:fontRef idx="minor">
+            <a:schemeClr val="tx1"/>
+          </a:fontRef>
+        </p:style>
+      </p:cxnSp>
+      <p:sp>
+        <p:nvSpPr>
+          <p:cNvPr id="1424547554" name="" hidden="0"/>
+          <p:cNvSpPr txBox="1"/>
+          <p:nvPr isPhoto="0" userDrawn="0"/>
+        </p:nvSpPr>
+        <p:spPr bwMode="auto">
+          <a:xfrm flipH="0" flipV="0">
+            <a:off x="5357405" y="3037216"/>
+            <a:ext cx="2372263" cy="1463076"/>
+          </a:xfrm>
+          <a:prstGeom prst="rect">
+            <a:avLst/>
+          </a:prstGeom>
+          <a:noFill/>
+        </p:spPr>
+        <p:txBody>
+          <a:bodyPr vertOverflow="overflow" horzOverflow="clip" vert="horz" wrap="square" lIns="91440" tIns="45720" rIns="91440" bIns="45720" numCol="1" spcCol="0" rtlCol="0" fromWordArt="0" anchor="t" anchorCtr="0" forceAA="0" upright="0" compatLnSpc="0">
+            <a:noAutofit/>
+          </a:bodyPr>
+          <a:p>
+            <a:pPr>
+              <a:defRPr/>
+            </a:pPr>
+            <a:r>
+              <a:rPr/>
+              <a:t>24 Frames später...</a:t>
+            </a:r>
+            <a:endParaRPr/>
+          </a:p>
+        </p:txBody>
+      </p:sp>
+      <p:sp>
+        <p:nvSpPr>
+          <p:cNvPr id="655521650" name="" hidden="0"/>
+          <p:cNvSpPr/>
+          <p:nvPr isPhoto="0" userDrawn="0"/>
+        </p:nvSpPr>
+        <p:spPr bwMode="auto">
+          <a:xfrm flipH="0" flipV="0">
+            <a:off x="8915800" y="4187405"/>
+            <a:ext cx="2102688" cy="862641"/>
+          </a:xfrm>
+          <a:prstGeom prst="wedgeRectCallout">
+            <a:avLst>
+              <a:gd name="adj1" fmla="val -30588"/>
+              <a:gd name="adj2" fmla="val -64423"/>
+            </a:avLst>
+          </a:prstGeom>
+          <a:solidFill>
+            <a:schemeClr val="bg1"/>
+          </a:solidFill>
+          <a:ln w="12700" cap="flat" cmpd="sng" algn="ctr">
+            <a:solidFill>
+              <a:schemeClr val="accent3">
+                <a:lumMod val="60000"/>
+                <a:lumOff val="40000"/>
+              </a:schemeClr>
+            </a:solidFill>
+            <a:prstDash val="solid"/>
+            <a:miter/>
+          </a:ln>
+        </p:spPr>
+        <p:style>
+          <a:lnRef idx="2">
+            <a:schemeClr val="accent1">
+              <a:shade val="50000"/>
+            </a:schemeClr>
+          </a:lnRef>
+          <a:fillRef idx="1">
+            <a:schemeClr val="accent1"/>
+          </a:fillRef>
+          <a:effectRef idx="0">
+            <a:schemeClr val="accent1"/>
+          </a:effectRef>
+          <a:fontRef idx="minor">
+            <a:schemeClr val="lt1"/>
+          </a:fontRef>
+        </p:style>
+        <p:txBody>
+          <a:bodyPr/>
+          <a:p>
+            <a:pPr>
+              <a:defRPr/>
+            </a:pPr>
+            <a:r>
+              <a:rPr>
+                <a:solidFill>
+                  <a:schemeClr val="tx1"/>
+                </a:solidFill>
+              </a:rPr>
+              <a:t>Führe die Aktion aus (...hier: player.move()</a:t>
+            </a:r>
+            <a:endParaRPr>
+              <a:solidFill>
+                <a:schemeClr val="tx1"/>
+              </a:solidFill>
+            </a:endParaRPr>
+          </a:p>
+        </p:txBody>
+      </p:sp>
+      <p:pic>
+        <p:nvPicPr>
+          <p:cNvPr id="474880824" name="" hidden="0"/>
+          <p:cNvPicPr>
+            <a:picLocks noChangeAspect="1"/>
+          </p:cNvPicPr>
+          <p:nvPr isPhoto="0" userDrawn="0"/>
+        </p:nvPicPr>
+        <p:blipFill>
+          <a:blip r:embed="rId3"/>
+          <a:stretch/>
+        </p:blipFill>
+        <p:spPr bwMode="auto">
+          <a:xfrm flipH="0" flipV="0">
+            <a:off x="8784564" y="2759517"/>
+            <a:ext cx="912640" cy="1171222"/>
+          </a:xfrm>
+          <a:prstGeom prst="rect">
+            <a:avLst/>
+          </a:prstGeom>
+        </p:spPr>
+      </p:pic>
     </p:spTree>
   </p:cSld>
   <p:clrMapOvr>

</xml_diff>